<commit_message>
updated the ppt with EC2
Added more information about the security groups, how to SSH the EC2 instance and different pricing options of EC2.
</commit_message>
<xml_diff>
--- a/AWS-SAA.pptx
+++ b/AWS-SAA.pptx
@@ -27,6 +27,22 @@
     <p:sldId id="275" r:id="rId21"/>
     <p:sldId id="276" r:id="rId22"/>
     <p:sldId id="277" r:id="rId23"/>
+    <p:sldId id="278" r:id="rId24"/>
+    <p:sldId id="279" r:id="rId25"/>
+    <p:sldId id="280" r:id="rId26"/>
+    <p:sldId id="281" r:id="rId27"/>
+    <p:sldId id="282" r:id="rId28"/>
+    <p:sldId id="283" r:id="rId29"/>
+    <p:sldId id="284" r:id="rId30"/>
+    <p:sldId id="285" r:id="rId31"/>
+    <p:sldId id="286" r:id="rId32"/>
+    <p:sldId id="287" r:id="rId33"/>
+    <p:sldId id="288" r:id="rId34"/>
+    <p:sldId id="289" r:id="rId35"/>
+    <p:sldId id="290" r:id="rId36"/>
+    <p:sldId id="291" r:id="rId37"/>
+    <p:sldId id="292" r:id="rId38"/>
+    <p:sldId id="293" r:id="rId39"/>
   </p:sldIdLst>
   <p:sldSz cx="12192000" cy="6858000"/>
   <p:notesSz cx="6858000" cy="9144000"/>
@@ -125,6 +141,11 @@
       </a:defRPr>
     </a:lvl9pPr>
   </p:defaultTextStyle>
+  <p:extLst>
+    <p:ext uri="{EFAFB233-063F-42B5-8137-9DF3F51BA10A}">
+      <p15:sldGuideLst xmlns:p15="http://schemas.microsoft.com/office/powerpoint/2012/main"/>
+    </p:ext>
+  </p:extLst>
 </p:presentation>
 </file>
 
@@ -267,7 +288,7 @@
           <a:p>
             <a:fld id="{48A87A34-81AB-432B-8DAE-1953F412C126}" type="datetimeFigureOut">
               <a:rPr lang="en-US" dirty="0"/>
-              <a:t>5/2/22</a:t>
+              <a:t>5/4/22</a:t>
             </a:fld>
             <a:endParaRPr lang="en-US" dirty="0"/>
           </a:p>
@@ -473,7 +494,7 @@
           <a:p>
             <a:fld id="{48A87A34-81AB-432B-8DAE-1953F412C126}" type="datetimeFigureOut">
               <a:rPr lang="en-US" dirty="0"/>
-              <a:t>5/2/22</a:t>
+              <a:t>5/4/22</a:t>
             </a:fld>
             <a:endParaRPr lang="en-US" dirty="0"/>
           </a:p>
@@ -683,7 +704,7 @@
           <a:p>
             <a:fld id="{48A87A34-81AB-432B-8DAE-1953F412C126}" type="datetimeFigureOut">
               <a:rPr lang="en-US" dirty="0"/>
-              <a:t>5/2/22</a:t>
+              <a:t>5/4/22</a:t>
             </a:fld>
             <a:endParaRPr lang="en-US" dirty="0"/>
           </a:p>
@@ -879,7 +900,7 @@
           <a:p>
             <a:fld id="{48A87A34-81AB-432B-8DAE-1953F412C126}" type="datetimeFigureOut">
               <a:rPr lang="en-US" dirty="0"/>
-              <a:t>5/2/22</a:t>
+              <a:t>5/4/22</a:t>
             </a:fld>
             <a:endParaRPr lang="en-US" dirty="0"/>
           </a:p>
@@ -1153,7 +1174,7 @@
           <a:p>
             <a:fld id="{48A87A34-81AB-432B-8DAE-1953F412C126}" type="datetimeFigureOut">
               <a:rPr lang="en-US" dirty="0"/>
-              <a:t>5/2/22</a:t>
+              <a:t>5/4/22</a:t>
             </a:fld>
             <a:endParaRPr lang="en-US" dirty="0"/>
           </a:p>
@@ -1416,7 +1437,7 @@
           <a:p>
             <a:fld id="{48A87A34-81AB-432B-8DAE-1953F412C126}" type="datetimeFigureOut">
               <a:rPr lang="en-US" dirty="0"/>
-              <a:t>5/2/22</a:t>
+              <a:t>5/4/22</a:t>
             </a:fld>
             <a:endParaRPr lang="en-US" dirty="0"/>
           </a:p>
@@ -1827,7 +1848,7 @@
           <a:p>
             <a:fld id="{48A87A34-81AB-432B-8DAE-1953F412C126}" type="datetimeFigureOut">
               <a:rPr lang="en-US" dirty="0"/>
-              <a:t>5/2/22</a:t>
+              <a:t>5/4/22</a:t>
             </a:fld>
             <a:endParaRPr lang="en-US" dirty="0"/>
           </a:p>
@@ -1971,7 +1992,7 @@
           <a:p>
             <a:fld id="{48A87A34-81AB-432B-8DAE-1953F412C126}" type="datetimeFigureOut">
               <a:rPr lang="en-US" dirty="0"/>
-              <a:t>5/2/22</a:t>
+              <a:t>5/4/22</a:t>
             </a:fld>
             <a:endParaRPr lang="en-US" dirty="0"/>
           </a:p>
@@ -2092,7 +2113,7 @@
           <a:p>
             <a:fld id="{48A87A34-81AB-432B-8DAE-1953F412C126}" type="datetimeFigureOut">
               <a:rPr lang="en-US" dirty="0"/>
-              <a:t>5/2/22</a:t>
+              <a:t>5/4/22</a:t>
             </a:fld>
             <a:endParaRPr lang="en-US" dirty="0"/>
           </a:p>
@@ -2338,7 +2359,7 @@
           <a:p>
             <a:fld id="{48A87A34-81AB-432B-8DAE-1953F412C126}" type="datetimeFigureOut">
               <a:rPr lang="en-US" dirty="0"/>
-              <a:t>5/2/22</a:t>
+              <a:t>5/4/22</a:t>
             </a:fld>
             <a:endParaRPr lang="en-US" dirty="0"/>
           </a:p>
@@ -2779,7 +2800,7 @@
             <a:fld id="{48A87A34-81AB-432B-8DAE-1953F412C126}" type="datetimeFigureOut">
               <a:rPr lang="en-US" dirty="0"/>
               <a:pPr/>
-              <a:t>5/2/22</a:t>
+              <a:t>5/4/22</a:t>
             </a:fld>
             <a:endParaRPr lang="en-US" dirty="0"/>
           </a:p>
@@ -3102,7 +3123,7 @@
             <a:fld id="{48A87A34-81AB-432B-8DAE-1953F412C126}" type="datetimeFigureOut">
               <a:rPr lang="en-US" dirty="0"/>
               <a:pPr/>
-              <a:t>5/2/22</a:t>
+              <a:t>5/4/22</a:t>
             </a:fld>
             <a:endParaRPr lang="en-US" dirty="0"/>
           </a:p>
@@ -5144,13 +5165,8 @@
           <a:p>
             <a:r>
               <a:rPr lang="en-US" dirty="0"/>
-              <a:t>Launching an ec2 instance running on </a:t>
-            </a:r>
-            <a:r>
-              <a:rPr lang="en-US" dirty="0" err="1"/>
-              <a:t>linux</a:t>
-            </a:r>
-            <a:endParaRPr lang="en-US" dirty="0"/>
+              <a:t>Launching an ec2 instance running on linux</a:t>
+            </a:r>
           </a:p>
         </p:txBody>
       </p:sp>
@@ -5951,6 +5967,853 @@
 </p:sld>
 </file>
 
+<file path=ppt/slides/slide23.xml><?xml version="1.0" encoding="utf-8"?>
+<p:sld xmlns:a="http://schemas.openxmlformats.org/drawingml/2006/main" xmlns:r="http://schemas.openxmlformats.org/officeDocument/2006/relationships" xmlns:p="http://schemas.openxmlformats.org/presentationml/2006/main">
+  <p:cSld>
+    <p:spTree>
+      <p:nvGrpSpPr>
+        <p:cNvPr id="1" name=""/>
+        <p:cNvGrpSpPr/>
+        <p:nvPr/>
+      </p:nvGrpSpPr>
+      <p:grpSpPr>
+        <a:xfrm>
+          <a:off x="0" y="0"/>
+          <a:ext cx="0" cy="0"/>
+          <a:chOff x="0" y="0"/>
+          <a:chExt cx="0" cy="0"/>
+        </a:xfrm>
+      </p:grpSpPr>
+      <p:sp>
+        <p:nvSpPr>
+          <p:cNvPr id="2" name="Title 1">
+            <a:extLst>
+              <a:ext uri="{FF2B5EF4-FFF2-40B4-BE49-F238E27FC236}">
+                <a16:creationId xmlns:a16="http://schemas.microsoft.com/office/drawing/2014/main" id="{18C07E27-63F1-7753-46D0-1FAB2DD922B0}"/>
+              </a:ext>
+            </a:extLst>
+          </p:cNvPr>
+          <p:cNvSpPr>
+            <a:spLocks noGrp="1"/>
+          </p:cNvSpPr>
+          <p:nvPr>
+            <p:ph type="title"/>
+          </p:nvPr>
+        </p:nvSpPr>
+        <p:spPr/>
+        <p:txBody>
+          <a:bodyPr/>
+          <a:lstStyle/>
+          <a:p>
+            <a:r>
+              <a:rPr lang="en-US" dirty="0"/>
+              <a:t>Security groups in ec2</a:t>
+            </a:r>
+          </a:p>
+        </p:txBody>
+      </p:sp>
+      <p:sp>
+        <p:nvSpPr>
+          <p:cNvPr id="3" name="Content Placeholder 2">
+            <a:extLst>
+              <a:ext uri="{FF2B5EF4-FFF2-40B4-BE49-F238E27FC236}">
+                <a16:creationId xmlns:a16="http://schemas.microsoft.com/office/drawing/2014/main" id="{BB17CC64-3718-CCD4-C393-20F25B398ED6}"/>
+              </a:ext>
+            </a:extLst>
+          </p:cNvPr>
+          <p:cNvSpPr>
+            <a:spLocks noGrp="1"/>
+          </p:cNvSpPr>
+          <p:nvPr>
+            <p:ph idx="1"/>
+          </p:nvPr>
+        </p:nvSpPr>
+        <p:spPr/>
+        <p:txBody>
+          <a:bodyPr>
+            <a:normAutofit fontScale="92500" lnSpcReduction="20000"/>
+          </a:bodyPr>
+          <a:lstStyle/>
+          <a:p>
+            <a:r>
+              <a:rPr lang="en-US" dirty="0"/>
+              <a:t>Security group are fundamental of networking in AWS</a:t>
+            </a:r>
+          </a:p>
+          <a:p>
+            <a:r>
+              <a:rPr lang="en-US" dirty="0"/>
+              <a:t>They control how traffic is allowed into or out of our ec2 instances.</a:t>
+            </a:r>
+          </a:p>
+          <a:p>
+            <a:r>
+              <a:rPr lang="en-US" dirty="0"/>
+              <a:t>Security group only contains allow rules.</a:t>
+            </a:r>
+          </a:p>
+          <a:p>
+            <a:r>
+              <a:rPr lang="en-US" dirty="0"/>
+              <a:t>Security group can reference by IP or by other security group</a:t>
+            </a:r>
+          </a:p>
+          <a:p>
+            <a:r>
+              <a:rPr lang="en-US" dirty="0"/>
+              <a:t>Security group acts as firewall on EC2 instances.</a:t>
+            </a:r>
+          </a:p>
+          <a:p>
+            <a:r>
+              <a:rPr lang="en-US" dirty="0"/>
+              <a:t>They regulate:</a:t>
+            </a:r>
+          </a:p>
+          <a:p>
+            <a:pPr lvl="1"/>
+            <a:r>
+              <a:rPr lang="en-US" dirty="0"/>
+              <a:t>Access to ports</a:t>
+            </a:r>
+          </a:p>
+          <a:p>
+            <a:pPr lvl="1"/>
+            <a:r>
+              <a:rPr lang="en-US" dirty="0"/>
+              <a:t>Authorized IP ranges- IPV4 &amp; IPV6</a:t>
+            </a:r>
+          </a:p>
+          <a:p>
+            <a:pPr lvl="1"/>
+            <a:r>
+              <a:rPr lang="en-US" dirty="0"/>
+              <a:t>Control of inbound &amp; outbound network.</a:t>
+            </a:r>
+          </a:p>
+        </p:txBody>
+      </p:sp>
+    </p:spTree>
+    <p:extLst>
+      <p:ext uri="{BB962C8B-B14F-4D97-AF65-F5344CB8AC3E}">
+        <p14:creationId xmlns:p14="http://schemas.microsoft.com/office/powerpoint/2010/main" val="1994378096"/>
+      </p:ext>
+    </p:extLst>
+  </p:cSld>
+  <p:clrMapOvr>
+    <a:masterClrMapping/>
+  </p:clrMapOvr>
+</p:sld>
+</file>
+
+<file path=ppt/slides/slide24.xml><?xml version="1.0" encoding="utf-8"?>
+<p:sld xmlns:a="http://schemas.openxmlformats.org/drawingml/2006/main" xmlns:r="http://schemas.openxmlformats.org/officeDocument/2006/relationships" xmlns:p="http://schemas.openxmlformats.org/presentationml/2006/main">
+  <p:cSld>
+    <p:spTree>
+      <p:nvGrpSpPr>
+        <p:cNvPr id="1" name=""/>
+        <p:cNvGrpSpPr/>
+        <p:nvPr/>
+      </p:nvGrpSpPr>
+      <p:grpSpPr>
+        <a:xfrm>
+          <a:off x="0" y="0"/>
+          <a:ext cx="0" cy="0"/>
+          <a:chOff x="0" y="0"/>
+          <a:chExt cx="0" cy="0"/>
+        </a:xfrm>
+      </p:grpSpPr>
+      <p:sp>
+        <p:nvSpPr>
+          <p:cNvPr id="2" name="Title 1">
+            <a:extLst>
+              <a:ext uri="{FF2B5EF4-FFF2-40B4-BE49-F238E27FC236}">
+                <a16:creationId xmlns:a16="http://schemas.microsoft.com/office/drawing/2014/main" id="{F5C99868-9CAE-D9A2-CF16-0AB715A91915}"/>
+              </a:ext>
+            </a:extLst>
+          </p:cNvPr>
+          <p:cNvSpPr>
+            <a:spLocks noGrp="1"/>
+          </p:cNvSpPr>
+          <p:nvPr>
+            <p:ph type="title"/>
+          </p:nvPr>
+        </p:nvSpPr>
+        <p:spPr/>
+        <p:txBody>
+          <a:bodyPr/>
+          <a:lstStyle/>
+          <a:p>
+            <a:r>
+              <a:rPr lang="en-US" dirty="0"/>
+              <a:t>Security groups in ec2 contd..</a:t>
+            </a:r>
+          </a:p>
+        </p:txBody>
+      </p:sp>
+      <p:sp>
+        <p:nvSpPr>
+          <p:cNvPr id="3" name="Content Placeholder 2">
+            <a:extLst>
+              <a:ext uri="{FF2B5EF4-FFF2-40B4-BE49-F238E27FC236}">
+                <a16:creationId xmlns:a16="http://schemas.microsoft.com/office/drawing/2014/main" id="{7EE5F21D-9B3E-6D12-1003-BB3B1689FECB}"/>
+              </a:ext>
+            </a:extLst>
+          </p:cNvPr>
+          <p:cNvSpPr>
+            <a:spLocks noGrp="1"/>
+          </p:cNvSpPr>
+          <p:nvPr>
+            <p:ph idx="1"/>
+          </p:nvPr>
+        </p:nvSpPr>
+        <p:spPr/>
+        <p:txBody>
+          <a:bodyPr/>
+          <a:lstStyle/>
+          <a:p>
+            <a:r>
+              <a:rPr lang="en-US" dirty="0"/>
+              <a:t>They can be attached to multiple instances, similarly an EC2 instance can have multiple security groups.</a:t>
+            </a:r>
+          </a:p>
+          <a:p>
+            <a:r>
+              <a:rPr lang="en-US" dirty="0"/>
+              <a:t>Security groups are locked down to a region/VPC combination. (meaning if we change the region or VPC then the security group will not be present)</a:t>
+            </a:r>
+          </a:p>
+          <a:p>
+            <a:r>
+              <a:rPr lang="en-US" dirty="0"/>
+              <a:t>Its good to maintain one separate security group for SSH access.</a:t>
+            </a:r>
+          </a:p>
+          <a:p>
+            <a:r>
+              <a:rPr lang="en-US" dirty="0"/>
+              <a:t>If your application is not accessible(time out) then it’s a security group issue.</a:t>
+            </a:r>
+          </a:p>
+          <a:p>
+            <a:endParaRPr lang="en-US" dirty="0"/>
+          </a:p>
+        </p:txBody>
+      </p:sp>
+    </p:spTree>
+    <p:extLst>
+      <p:ext uri="{BB962C8B-B14F-4D97-AF65-F5344CB8AC3E}">
+        <p14:creationId xmlns:p14="http://schemas.microsoft.com/office/powerpoint/2010/main" val="3250664322"/>
+      </p:ext>
+    </p:extLst>
+  </p:cSld>
+  <p:clrMapOvr>
+    <a:masterClrMapping/>
+  </p:clrMapOvr>
+</p:sld>
+</file>
+
+<file path=ppt/slides/slide25.xml><?xml version="1.0" encoding="utf-8"?>
+<p:sld xmlns:a="http://schemas.openxmlformats.org/drawingml/2006/main" xmlns:r="http://schemas.openxmlformats.org/officeDocument/2006/relationships" xmlns:p="http://schemas.openxmlformats.org/presentationml/2006/main">
+  <p:cSld>
+    <p:spTree>
+      <p:nvGrpSpPr>
+        <p:cNvPr id="1" name=""/>
+        <p:cNvGrpSpPr/>
+        <p:nvPr/>
+      </p:nvGrpSpPr>
+      <p:grpSpPr>
+        <a:xfrm>
+          <a:off x="0" y="0"/>
+          <a:ext cx="0" cy="0"/>
+          <a:chOff x="0" y="0"/>
+          <a:chExt cx="0" cy="0"/>
+        </a:xfrm>
+      </p:grpSpPr>
+      <p:sp>
+        <p:nvSpPr>
+          <p:cNvPr id="2" name="Title 1">
+            <a:extLst>
+              <a:ext uri="{FF2B5EF4-FFF2-40B4-BE49-F238E27FC236}">
+                <a16:creationId xmlns:a16="http://schemas.microsoft.com/office/drawing/2014/main" id="{C253C2B6-63BB-68BF-D515-983D9C388B1C}"/>
+              </a:ext>
+            </a:extLst>
+          </p:cNvPr>
+          <p:cNvSpPr>
+            <a:spLocks noGrp="1"/>
+          </p:cNvSpPr>
+          <p:nvPr>
+            <p:ph type="title"/>
+          </p:nvPr>
+        </p:nvSpPr>
+        <p:spPr/>
+        <p:txBody>
+          <a:bodyPr/>
+          <a:lstStyle/>
+          <a:p>
+            <a:r>
+              <a:rPr lang="en-US" dirty="0"/>
+              <a:t>Security groups in ec2 contd.,</a:t>
+            </a:r>
+          </a:p>
+        </p:txBody>
+      </p:sp>
+      <p:sp>
+        <p:nvSpPr>
+          <p:cNvPr id="3" name="Content Placeholder 2">
+            <a:extLst>
+              <a:ext uri="{FF2B5EF4-FFF2-40B4-BE49-F238E27FC236}">
+                <a16:creationId xmlns:a16="http://schemas.microsoft.com/office/drawing/2014/main" id="{D327285E-3712-CFB9-256F-C722B27FC982}"/>
+              </a:ext>
+            </a:extLst>
+          </p:cNvPr>
+          <p:cNvSpPr>
+            <a:spLocks noGrp="1"/>
+          </p:cNvSpPr>
+          <p:nvPr>
+            <p:ph idx="1"/>
+          </p:nvPr>
+        </p:nvSpPr>
+        <p:spPr/>
+        <p:txBody>
+          <a:bodyPr>
+            <a:normAutofit lnSpcReduction="10000"/>
+          </a:bodyPr>
+          <a:lstStyle/>
+          <a:p>
+            <a:r>
+              <a:rPr lang="en-US" dirty="0"/>
+              <a:t>If your application gives a connection refused error, then its an application error or its not launched.</a:t>
+            </a:r>
+          </a:p>
+          <a:p>
+            <a:r>
+              <a:rPr lang="en-US" dirty="0"/>
+              <a:t>All inbound traffic is blocked by default.</a:t>
+            </a:r>
+          </a:p>
+          <a:p>
+            <a:r>
+              <a:rPr lang="en-US" dirty="0"/>
+              <a:t>All outbound traffic is authorized by default.</a:t>
+            </a:r>
+          </a:p>
+          <a:p>
+            <a:r>
+              <a:rPr lang="en-US" dirty="0"/>
+              <a:t>Referencing other security group:</a:t>
+            </a:r>
+          </a:p>
+          <a:p>
+            <a:pPr lvl="1"/>
+            <a:r>
+              <a:rPr lang="en-US" dirty="0"/>
+              <a:t>if the EC2 instance is attached with a security group 1 and has inbound rules with authorized to security group 1 and security group 2, then another EC2 instances with security group 1 &amp; 2 can access the EC2 instance, whereas the EC2 instance with security group 3 cannot access it.</a:t>
+            </a:r>
+          </a:p>
+          <a:p>
+            <a:endParaRPr lang="en-US" dirty="0"/>
+          </a:p>
+        </p:txBody>
+      </p:sp>
+    </p:spTree>
+    <p:extLst>
+      <p:ext uri="{BB962C8B-B14F-4D97-AF65-F5344CB8AC3E}">
+        <p14:creationId xmlns:p14="http://schemas.microsoft.com/office/powerpoint/2010/main" val="2319438206"/>
+      </p:ext>
+    </p:extLst>
+  </p:cSld>
+  <p:clrMapOvr>
+    <a:masterClrMapping/>
+  </p:clrMapOvr>
+</p:sld>
+</file>
+
+<file path=ppt/slides/slide26.xml><?xml version="1.0" encoding="utf-8"?>
+<p:sld xmlns:a="http://schemas.openxmlformats.org/drawingml/2006/main" xmlns:r="http://schemas.openxmlformats.org/officeDocument/2006/relationships" xmlns:p="http://schemas.openxmlformats.org/presentationml/2006/main">
+  <p:cSld>
+    <p:spTree>
+      <p:nvGrpSpPr>
+        <p:cNvPr id="1" name=""/>
+        <p:cNvGrpSpPr/>
+        <p:nvPr/>
+      </p:nvGrpSpPr>
+      <p:grpSpPr>
+        <a:xfrm>
+          <a:off x="0" y="0"/>
+          <a:ext cx="0" cy="0"/>
+          <a:chOff x="0" y="0"/>
+          <a:chExt cx="0" cy="0"/>
+        </a:xfrm>
+      </p:grpSpPr>
+      <p:sp>
+        <p:nvSpPr>
+          <p:cNvPr id="2" name="Title 1">
+            <a:extLst>
+              <a:ext uri="{FF2B5EF4-FFF2-40B4-BE49-F238E27FC236}">
+                <a16:creationId xmlns:a16="http://schemas.microsoft.com/office/drawing/2014/main" id="{9236F7A3-ABEE-97B0-8B12-BE9FD07C7C9A}"/>
+              </a:ext>
+            </a:extLst>
+          </p:cNvPr>
+          <p:cNvSpPr>
+            <a:spLocks noGrp="1"/>
+          </p:cNvSpPr>
+          <p:nvPr>
+            <p:ph type="title"/>
+          </p:nvPr>
+        </p:nvSpPr>
+        <p:spPr/>
+        <p:txBody>
+          <a:bodyPr/>
+          <a:lstStyle/>
+          <a:p>
+            <a:r>
+              <a:rPr lang="en-US" dirty="0"/>
+              <a:t>Classic ports to know </a:t>
+            </a:r>
+          </a:p>
+        </p:txBody>
+      </p:sp>
+      <p:sp>
+        <p:nvSpPr>
+          <p:cNvPr id="3" name="Content Placeholder 2">
+            <a:extLst>
+              <a:ext uri="{FF2B5EF4-FFF2-40B4-BE49-F238E27FC236}">
+                <a16:creationId xmlns:a16="http://schemas.microsoft.com/office/drawing/2014/main" id="{B371FCB7-4A22-B7B7-7837-89D4A44192C3}"/>
+              </a:ext>
+            </a:extLst>
+          </p:cNvPr>
+          <p:cNvSpPr>
+            <a:spLocks noGrp="1"/>
+          </p:cNvSpPr>
+          <p:nvPr>
+            <p:ph idx="1"/>
+          </p:nvPr>
+        </p:nvSpPr>
+        <p:spPr/>
+        <p:txBody>
+          <a:bodyPr/>
+          <a:lstStyle/>
+          <a:p>
+            <a:r>
+              <a:rPr lang="en-US" dirty="0"/>
+              <a:t>22 – SSH (secure shell) – log in to a Linux instance.</a:t>
+            </a:r>
+          </a:p>
+          <a:p>
+            <a:r>
+              <a:rPr lang="en-US" dirty="0"/>
+              <a:t>21 – FTP (file transfer protocol) – upload files using file share.</a:t>
+            </a:r>
+          </a:p>
+          <a:p>
+            <a:r>
+              <a:rPr lang="en-US" dirty="0"/>
+              <a:t>22 – SFTP (secure file transfer protocol) – upload file using SSH.</a:t>
+            </a:r>
+          </a:p>
+          <a:p>
+            <a:r>
+              <a:rPr lang="en-US" dirty="0"/>
+              <a:t>80 – HTTP – access unsecured website.</a:t>
+            </a:r>
+          </a:p>
+          <a:p>
+            <a:r>
+              <a:rPr lang="en-US" dirty="0"/>
+              <a:t>443 – HTTPS – access secured website.</a:t>
+            </a:r>
+          </a:p>
+          <a:p>
+            <a:r>
+              <a:rPr lang="en-US" dirty="0"/>
+              <a:t>3389 – RDP – (remote desktop protocol) – log into a remote windows instance.</a:t>
+            </a:r>
+          </a:p>
+          <a:p>
+            <a:endParaRPr lang="en-US" dirty="0"/>
+          </a:p>
+        </p:txBody>
+      </p:sp>
+    </p:spTree>
+    <p:extLst>
+      <p:ext uri="{BB962C8B-B14F-4D97-AF65-F5344CB8AC3E}">
+        <p14:creationId xmlns:p14="http://schemas.microsoft.com/office/powerpoint/2010/main" val="396444512"/>
+      </p:ext>
+    </p:extLst>
+  </p:cSld>
+  <p:clrMapOvr>
+    <a:masterClrMapping/>
+  </p:clrMapOvr>
+</p:sld>
+</file>
+
+<file path=ppt/slides/slide27.xml><?xml version="1.0" encoding="utf-8"?>
+<p:sld xmlns:a="http://schemas.openxmlformats.org/drawingml/2006/main" xmlns:r="http://schemas.openxmlformats.org/officeDocument/2006/relationships" xmlns:p="http://schemas.openxmlformats.org/presentationml/2006/main">
+  <p:cSld>
+    <p:spTree>
+      <p:nvGrpSpPr>
+        <p:cNvPr id="1" name=""/>
+        <p:cNvGrpSpPr/>
+        <p:nvPr/>
+      </p:nvGrpSpPr>
+      <p:grpSpPr>
+        <a:xfrm>
+          <a:off x="0" y="0"/>
+          <a:ext cx="0" cy="0"/>
+          <a:chOff x="0" y="0"/>
+          <a:chExt cx="0" cy="0"/>
+        </a:xfrm>
+      </p:grpSpPr>
+      <p:sp>
+        <p:nvSpPr>
+          <p:cNvPr id="2" name="Title 1">
+            <a:extLst>
+              <a:ext uri="{FF2B5EF4-FFF2-40B4-BE49-F238E27FC236}">
+                <a16:creationId xmlns:a16="http://schemas.microsoft.com/office/drawing/2014/main" id="{1D0C220E-8369-EF0F-CF1A-18EB03AF27AF}"/>
+              </a:ext>
+            </a:extLst>
+          </p:cNvPr>
+          <p:cNvSpPr>
+            <a:spLocks noGrp="1"/>
+          </p:cNvSpPr>
+          <p:nvPr>
+            <p:ph type="title"/>
+          </p:nvPr>
+        </p:nvSpPr>
+        <p:spPr/>
+        <p:txBody>
+          <a:bodyPr/>
+          <a:lstStyle/>
+          <a:p>
+            <a:r>
+              <a:rPr lang="en-US" dirty="0"/>
+              <a:t>Ssh (secure shell)</a:t>
+            </a:r>
+          </a:p>
+        </p:txBody>
+      </p:sp>
+      <p:sp>
+        <p:nvSpPr>
+          <p:cNvPr id="3" name="Content Placeholder 2">
+            <a:extLst>
+              <a:ext uri="{FF2B5EF4-FFF2-40B4-BE49-F238E27FC236}">
+                <a16:creationId xmlns:a16="http://schemas.microsoft.com/office/drawing/2014/main" id="{B815085E-226D-6A28-56B8-27ABB09517B1}"/>
+              </a:ext>
+            </a:extLst>
+          </p:cNvPr>
+          <p:cNvSpPr>
+            <a:spLocks noGrp="1"/>
+          </p:cNvSpPr>
+          <p:nvPr>
+            <p:ph idx="1"/>
+          </p:nvPr>
+        </p:nvSpPr>
+        <p:spPr/>
+        <p:txBody>
+          <a:bodyPr/>
+          <a:lstStyle/>
+          <a:p>
+            <a:r>
+              <a:rPr lang="en-US" dirty="0"/>
+              <a:t>SSH us a command line utility that we can use in mac, Linux &amp; windows&gt;10.</a:t>
+            </a:r>
+          </a:p>
+          <a:p>
+            <a:r>
+              <a:rPr lang="en-US" dirty="0"/>
+              <a:t>For windows&lt;=10 we can use putty.</a:t>
+            </a:r>
+          </a:p>
+          <a:p>
+            <a:r>
+              <a:rPr lang="en-US" dirty="0"/>
+              <a:t>In AWS we can also use WC2 instance connect which works on all OS types.</a:t>
+            </a:r>
+          </a:p>
+          <a:p>
+            <a:r>
+              <a:rPr lang="en-US" dirty="0"/>
+              <a:t>SSH is one of the most important function it allows you to control a remote machine by using the command line.</a:t>
+            </a:r>
+          </a:p>
+          <a:p>
+            <a:endParaRPr lang="en-US" dirty="0"/>
+          </a:p>
+        </p:txBody>
+      </p:sp>
+    </p:spTree>
+    <p:extLst>
+      <p:ext uri="{BB962C8B-B14F-4D97-AF65-F5344CB8AC3E}">
+        <p14:creationId xmlns:p14="http://schemas.microsoft.com/office/powerpoint/2010/main" val="1880564319"/>
+      </p:ext>
+    </p:extLst>
+  </p:cSld>
+  <p:clrMapOvr>
+    <a:masterClrMapping/>
+  </p:clrMapOvr>
+</p:sld>
+</file>
+
+<file path=ppt/slides/slide28.xml><?xml version="1.0" encoding="utf-8"?>
+<p:sld xmlns:a="http://schemas.openxmlformats.org/drawingml/2006/main" xmlns:r="http://schemas.openxmlformats.org/officeDocument/2006/relationships" xmlns:p="http://schemas.openxmlformats.org/presentationml/2006/main">
+  <p:cSld>
+    <p:spTree>
+      <p:nvGrpSpPr>
+        <p:cNvPr id="1" name=""/>
+        <p:cNvGrpSpPr/>
+        <p:nvPr/>
+      </p:nvGrpSpPr>
+      <p:grpSpPr>
+        <a:xfrm>
+          <a:off x="0" y="0"/>
+          <a:ext cx="0" cy="0"/>
+          <a:chOff x="0" y="0"/>
+          <a:chExt cx="0" cy="0"/>
+        </a:xfrm>
+      </p:grpSpPr>
+      <p:sp>
+        <p:nvSpPr>
+          <p:cNvPr id="2" name="Title 1">
+            <a:extLst>
+              <a:ext uri="{FF2B5EF4-FFF2-40B4-BE49-F238E27FC236}">
+                <a16:creationId xmlns:a16="http://schemas.microsoft.com/office/drawing/2014/main" id="{D65B9834-8088-401B-A165-0CD2EEF81106}"/>
+              </a:ext>
+            </a:extLst>
+          </p:cNvPr>
+          <p:cNvSpPr>
+            <a:spLocks noGrp="1"/>
+          </p:cNvSpPr>
+          <p:nvPr>
+            <p:ph type="title"/>
+          </p:nvPr>
+        </p:nvSpPr>
+        <p:spPr/>
+        <p:txBody>
+          <a:bodyPr/>
+          <a:lstStyle/>
+          <a:p>
+            <a:r>
+              <a:rPr lang="en-US" dirty="0"/>
+              <a:t>How to ssh using linux / Mac os</a:t>
+            </a:r>
+          </a:p>
+        </p:txBody>
+      </p:sp>
+      <p:sp>
+        <p:nvSpPr>
+          <p:cNvPr id="3" name="Content Placeholder 2">
+            <a:extLst>
+              <a:ext uri="{FF2B5EF4-FFF2-40B4-BE49-F238E27FC236}">
+                <a16:creationId xmlns:a16="http://schemas.microsoft.com/office/drawing/2014/main" id="{27CBA706-7FB4-BAE2-D644-D80E9386DCBE}"/>
+              </a:ext>
+            </a:extLst>
+          </p:cNvPr>
+          <p:cNvSpPr>
+            <a:spLocks noGrp="1"/>
+          </p:cNvSpPr>
+          <p:nvPr>
+            <p:ph idx="1"/>
+          </p:nvPr>
+        </p:nvSpPr>
+        <p:spPr/>
+        <p:txBody>
+          <a:bodyPr>
+            <a:normAutofit lnSpcReduction="10000"/>
+          </a:bodyPr>
+          <a:lstStyle/>
+          <a:p>
+            <a:r>
+              <a:rPr lang="en-US" dirty="0"/>
+              <a:t>Open the terminal.</a:t>
+            </a:r>
+          </a:p>
+          <a:p>
+            <a:r>
+              <a:rPr lang="en-US" dirty="0"/>
+              <a:t>Copy the .pem file of the EC2 instance to any directory. (change mode of the file to 0400)</a:t>
+            </a:r>
+          </a:p>
+          <a:p>
+            <a:r>
+              <a:rPr lang="en-US" dirty="0"/>
+              <a:t>Copy the IPV4 public IP from the EC2 instance (Make sure that the security group inbound rule is set for SSH).</a:t>
+            </a:r>
+          </a:p>
+          <a:p>
+            <a:r>
+              <a:rPr lang="en-US" dirty="0"/>
+              <a:t>Then type the command ssh ec2-user @IP (here the IP is the copied IP address).</a:t>
+            </a:r>
+          </a:p>
+          <a:p>
+            <a:r>
+              <a:rPr lang="en-US" dirty="0"/>
+              <a:t>Now you will be into EC2 machine.</a:t>
+            </a:r>
+          </a:p>
+          <a:p>
+            <a:r>
+              <a:rPr lang="en-US" dirty="0"/>
+              <a:t>To exit just type exit.</a:t>
+            </a:r>
+          </a:p>
+          <a:p>
+            <a:endParaRPr lang="en-US" dirty="0"/>
+          </a:p>
+          <a:p>
+            <a:endParaRPr lang="en-US" dirty="0"/>
+          </a:p>
+        </p:txBody>
+      </p:sp>
+    </p:spTree>
+    <p:extLst>
+      <p:ext uri="{BB962C8B-B14F-4D97-AF65-F5344CB8AC3E}">
+        <p14:creationId xmlns:p14="http://schemas.microsoft.com/office/powerpoint/2010/main" val="3455552510"/>
+      </p:ext>
+    </p:extLst>
+  </p:cSld>
+  <p:clrMapOvr>
+    <a:masterClrMapping/>
+  </p:clrMapOvr>
+</p:sld>
+</file>
+
+<file path=ppt/slides/slide29.xml><?xml version="1.0" encoding="utf-8"?>
+<p:sld xmlns:a="http://schemas.openxmlformats.org/drawingml/2006/main" xmlns:r="http://schemas.openxmlformats.org/officeDocument/2006/relationships" xmlns:p="http://schemas.openxmlformats.org/presentationml/2006/main">
+  <p:cSld>
+    <p:spTree>
+      <p:nvGrpSpPr>
+        <p:cNvPr id="1" name=""/>
+        <p:cNvGrpSpPr/>
+        <p:nvPr/>
+      </p:nvGrpSpPr>
+      <p:grpSpPr>
+        <a:xfrm>
+          <a:off x="0" y="0"/>
+          <a:ext cx="0" cy="0"/>
+          <a:chOff x="0" y="0"/>
+          <a:chExt cx="0" cy="0"/>
+        </a:xfrm>
+      </p:grpSpPr>
+      <p:sp>
+        <p:nvSpPr>
+          <p:cNvPr id="2" name="Title 1">
+            <a:extLst>
+              <a:ext uri="{FF2B5EF4-FFF2-40B4-BE49-F238E27FC236}">
+                <a16:creationId xmlns:a16="http://schemas.microsoft.com/office/drawing/2014/main" id="{2BDB11E0-2C0F-7556-8934-8DCD74EC0601}"/>
+              </a:ext>
+            </a:extLst>
+          </p:cNvPr>
+          <p:cNvSpPr>
+            <a:spLocks noGrp="1"/>
+          </p:cNvSpPr>
+          <p:nvPr>
+            <p:ph type="title"/>
+          </p:nvPr>
+        </p:nvSpPr>
+        <p:spPr/>
+        <p:txBody>
+          <a:bodyPr/>
+          <a:lstStyle/>
+          <a:p>
+            <a:r>
+              <a:rPr lang="en-US" dirty="0"/>
+              <a:t>Ec2 instance connect</a:t>
+            </a:r>
+          </a:p>
+        </p:txBody>
+      </p:sp>
+      <p:sp>
+        <p:nvSpPr>
+          <p:cNvPr id="3" name="Content Placeholder 2">
+            <a:extLst>
+              <a:ext uri="{FF2B5EF4-FFF2-40B4-BE49-F238E27FC236}">
+                <a16:creationId xmlns:a16="http://schemas.microsoft.com/office/drawing/2014/main" id="{E0CCFD01-194E-0A81-18AF-33E33C6DB7B4}"/>
+              </a:ext>
+            </a:extLst>
+          </p:cNvPr>
+          <p:cNvSpPr>
+            <a:spLocks noGrp="1"/>
+          </p:cNvSpPr>
+          <p:nvPr>
+            <p:ph idx="1"/>
+          </p:nvPr>
+        </p:nvSpPr>
+        <p:spPr/>
+        <p:txBody>
+          <a:bodyPr>
+            <a:normAutofit fontScale="92500" lnSpcReduction="10000"/>
+          </a:bodyPr>
+          <a:lstStyle/>
+          <a:p>
+            <a:r>
+              <a:rPr lang="en-US" dirty="0"/>
+              <a:t>This option is currently working for only the ubuntu and amazon linux 2 AMI’S.</a:t>
+            </a:r>
+          </a:p>
+          <a:p>
+            <a:r>
+              <a:rPr lang="en-US" dirty="0"/>
+              <a:t>This type of the connection also depends on the SSH so if the SSH rule is not included in the security group then this wont work though it is browser based.</a:t>
+            </a:r>
+          </a:p>
+          <a:p>
+            <a:r>
+              <a:rPr lang="en-US" dirty="0"/>
+              <a:t>To connect:</a:t>
+            </a:r>
+          </a:p>
+          <a:p>
+            <a:pPr lvl="1"/>
+            <a:r>
+              <a:rPr lang="en-US" dirty="0"/>
+              <a:t>Select your instance.</a:t>
+            </a:r>
+          </a:p>
+          <a:p>
+            <a:pPr lvl="1"/>
+            <a:r>
+              <a:rPr lang="en-US" dirty="0"/>
+              <a:t>Click on connect.</a:t>
+            </a:r>
+          </a:p>
+          <a:p>
+            <a:pPr lvl="1"/>
+            <a:r>
+              <a:rPr lang="en-US" dirty="0"/>
+              <a:t>Select EC2 instance connect.</a:t>
+            </a:r>
+          </a:p>
+          <a:p>
+            <a:pPr lvl="1"/>
+            <a:r>
+              <a:rPr lang="en-US" dirty="0"/>
+              <a:t>Give a username.</a:t>
+            </a:r>
+          </a:p>
+          <a:p>
+            <a:pPr lvl="1"/>
+            <a:r>
+              <a:rPr lang="en-US" dirty="0"/>
+              <a:t>Click on connect.</a:t>
+            </a:r>
+          </a:p>
+        </p:txBody>
+      </p:sp>
+    </p:spTree>
+    <p:extLst>
+      <p:ext uri="{BB962C8B-B14F-4D97-AF65-F5344CB8AC3E}">
+        <p14:creationId xmlns:p14="http://schemas.microsoft.com/office/powerpoint/2010/main" val="3929383260"/>
+      </p:ext>
+    </p:extLst>
+  </p:cSld>
+  <p:clrMapOvr>
+    <a:masterClrMapping/>
+  </p:clrMapOvr>
+</p:sld>
+</file>
+
 <file path=ppt/slides/slide3.xml><?xml version="1.0" encoding="utf-8"?>
 <p:sld xmlns:a="http://schemas.openxmlformats.org/drawingml/2006/main" xmlns:r="http://schemas.openxmlformats.org/officeDocument/2006/relationships" xmlns:p="http://schemas.openxmlformats.org/presentationml/2006/main">
   <p:cSld>
@@ -6058,6 +6921,1033 @@
     <p:extLst>
       <p:ext uri="{BB962C8B-B14F-4D97-AF65-F5344CB8AC3E}">
         <p14:creationId xmlns:p14="http://schemas.microsoft.com/office/powerpoint/2010/main" val="2584825314"/>
+      </p:ext>
+    </p:extLst>
+  </p:cSld>
+  <p:clrMapOvr>
+    <a:masterClrMapping/>
+  </p:clrMapOvr>
+</p:sld>
+</file>
+
+<file path=ppt/slides/slide30.xml><?xml version="1.0" encoding="utf-8"?>
+<p:sld xmlns:a="http://schemas.openxmlformats.org/drawingml/2006/main" xmlns:r="http://schemas.openxmlformats.org/officeDocument/2006/relationships" xmlns:p="http://schemas.openxmlformats.org/presentationml/2006/main">
+  <p:cSld>
+    <p:spTree>
+      <p:nvGrpSpPr>
+        <p:cNvPr id="1" name=""/>
+        <p:cNvGrpSpPr/>
+        <p:nvPr/>
+      </p:nvGrpSpPr>
+      <p:grpSpPr>
+        <a:xfrm>
+          <a:off x="0" y="0"/>
+          <a:ext cx="0" cy="0"/>
+          <a:chOff x="0" y="0"/>
+          <a:chExt cx="0" cy="0"/>
+        </a:xfrm>
+      </p:grpSpPr>
+      <p:sp>
+        <p:nvSpPr>
+          <p:cNvPr id="2" name="Title 1">
+            <a:extLst>
+              <a:ext uri="{FF2B5EF4-FFF2-40B4-BE49-F238E27FC236}">
+                <a16:creationId xmlns:a16="http://schemas.microsoft.com/office/drawing/2014/main" id="{904E677D-2259-EA03-C5F1-F11947B35DE7}"/>
+              </a:ext>
+            </a:extLst>
+          </p:cNvPr>
+          <p:cNvSpPr>
+            <a:spLocks noGrp="1"/>
+          </p:cNvSpPr>
+          <p:nvPr>
+            <p:ph type="title"/>
+          </p:nvPr>
+        </p:nvSpPr>
+        <p:spPr/>
+        <p:txBody>
+          <a:bodyPr/>
+          <a:lstStyle/>
+          <a:p>
+            <a:r>
+              <a:rPr lang="en-US" dirty="0"/>
+              <a:t>ec2 purchasing options</a:t>
+            </a:r>
+          </a:p>
+        </p:txBody>
+      </p:sp>
+      <p:sp>
+        <p:nvSpPr>
+          <p:cNvPr id="3" name="Content Placeholder 2">
+            <a:extLst>
+              <a:ext uri="{FF2B5EF4-FFF2-40B4-BE49-F238E27FC236}">
+                <a16:creationId xmlns:a16="http://schemas.microsoft.com/office/drawing/2014/main" id="{AF1F27EB-5590-D205-FFE8-AEBA3B543D76}"/>
+              </a:ext>
+            </a:extLst>
+          </p:cNvPr>
+          <p:cNvSpPr>
+            <a:spLocks noGrp="1"/>
+          </p:cNvSpPr>
+          <p:nvPr>
+            <p:ph idx="1"/>
+          </p:nvPr>
+        </p:nvSpPr>
+        <p:spPr/>
+        <p:txBody>
+          <a:bodyPr>
+            <a:normAutofit fontScale="85000" lnSpcReduction="20000"/>
+          </a:bodyPr>
+          <a:lstStyle/>
+          <a:p>
+            <a:r>
+              <a:rPr lang="en-US" dirty="0"/>
+              <a:t>On demand instances – they are good for short workload, predictable pricing, pay by second.</a:t>
+            </a:r>
+          </a:p>
+          <a:p>
+            <a:r>
+              <a:rPr lang="en-US" dirty="0"/>
+              <a:t>Reversed instances (1 &amp; 3 years) – they are good for long work loads.</a:t>
+            </a:r>
+          </a:p>
+          <a:p>
+            <a:r>
+              <a:rPr lang="en-US" dirty="0"/>
+              <a:t>Convertible reversed instances (1 &amp; 3 years) - long work loads with flexible instances.</a:t>
+            </a:r>
+          </a:p>
+          <a:p>
+            <a:r>
+              <a:rPr lang="en-US" dirty="0"/>
+              <a:t>Savings plan (1 &amp; 3 years) – commitment to an amount of usage(instead of committing to instances), long workloads.</a:t>
+            </a:r>
+          </a:p>
+          <a:p>
+            <a:r>
+              <a:rPr lang="en-US" dirty="0"/>
+              <a:t>Spot instances – short workloads, very cheap, can lose instances (less reliable).</a:t>
+            </a:r>
+          </a:p>
+          <a:p>
+            <a:r>
+              <a:rPr lang="en-US" dirty="0"/>
+              <a:t>Dedicated hosts – book an entire physical server, control instance placement.</a:t>
+            </a:r>
+          </a:p>
+          <a:p>
+            <a:r>
+              <a:rPr lang="en-US" dirty="0"/>
+              <a:t>Dedicated instances – no other customers will share your hardware.</a:t>
+            </a:r>
+          </a:p>
+          <a:p>
+            <a:r>
+              <a:rPr lang="en-US" dirty="0"/>
+              <a:t>Capacity reservations – reserve capacity in a specific AZ for any duration.</a:t>
+            </a:r>
+          </a:p>
+          <a:p>
+            <a:endParaRPr lang="en-US" dirty="0"/>
+          </a:p>
+        </p:txBody>
+      </p:sp>
+    </p:spTree>
+    <p:extLst>
+      <p:ext uri="{BB962C8B-B14F-4D97-AF65-F5344CB8AC3E}">
+        <p14:creationId xmlns:p14="http://schemas.microsoft.com/office/powerpoint/2010/main" val="3700069624"/>
+      </p:ext>
+    </p:extLst>
+  </p:cSld>
+  <p:clrMapOvr>
+    <a:masterClrMapping/>
+  </p:clrMapOvr>
+</p:sld>
+</file>
+
+<file path=ppt/slides/slide31.xml><?xml version="1.0" encoding="utf-8"?>
+<p:sld xmlns:a="http://schemas.openxmlformats.org/drawingml/2006/main" xmlns:r="http://schemas.openxmlformats.org/officeDocument/2006/relationships" xmlns:p="http://schemas.openxmlformats.org/presentationml/2006/main">
+  <p:cSld>
+    <p:spTree>
+      <p:nvGrpSpPr>
+        <p:cNvPr id="1" name=""/>
+        <p:cNvGrpSpPr/>
+        <p:nvPr/>
+      </p:nvGrpSpPr>
+      <p:grpSpPr>
+        <a:xfrm>
+          <a:off x="0" y="0"/>
+          <a:ext cx="0" cy="0"/>
+          <a:chOff x="0" y="0"/>
+          <a:chExt cx="0" cy="0"/>
+        </a:xfrm>
+      </p:grpSpPr>
+      <p:sp>
+        <p:nvSpPr>
+          <p:cNvPr id="2" name="Title 1">
+            <a:extLst>
+              <a:ext uri="{FF2B5EF4-FFF2-40B4-BE49-F238E27FC236}">
+                <a16:creationId xmlns:a16="http://schemas.microsoft.com/office/drawing/2014/main" id="{C26181AF-9942-2622-8BFC-48536A577DFA}"/>
+              </a:ext>
+            </a:extLst>
+          </p:cNvPr>
+          <p:cNvSpPr>
+            <a:spLocks noGrp="1"/>
+          </p:cNvSpPr>
+          <p:nvPr>
+            <p:ph type="title"/>
+          </p:nvPr>
+        </p:nvSpPr>
+        <p:spPr/>
+        <p:txBody>
+          <a:bodyPr/>
+          <a:lstStyle/>
+          <a:p>
+            <a:r>
+              <a:rPr lang="en-US" dirty="0"/>
+              <a:t>Pay on demand</a:t>
+            </a:r>
+          </a:p>
+        </p:txBody>
+      </p:sp>
+      <p:sp>
+        <p:nvSpPr>
+          <p:cNvPr id="3" name="Content Placeholder 2">
+            <a:extLst>
+              <a:ext uri="{FF2B5EF4-FFF2-40B4-BE49-F238E27FC236}">
+                <a16:creationId xmlns:a16="http://schemas.microsoft.com/office/drawing/2014/main" id="{E87D9115-85FF-1F5E-5548-E52C146E9152}"/>
+              </a:ext>
+            </a:extLst>
+          </p:cNvPr>
+          <p:cNvSpPr>
+            <a:spLocks noGrp="1"/>
+          </p:cNvSpPr>
+          <p:nvPr>
+            <p:ph idx="1"/>
+          </p:nvPr>
+        </p:nvSpPr>
+        <p:spPr/>
+        <p:txBody>
+          <a:bodyPr/>
+          <a:lstStyle/>
+          <a:p>
+            <a:endParaRPr lang="en-US"/>
+          </a:p>
+        </p:txBody>
+      </p:sp>
+      <p:pic>
+        <p:nvPicPr>
+          <p:cNvPr id="4" name="Picture 3">
+            <a:extLst>
+              <a:ext uri="{FF2B5EF4-FFF2-40B4-BE49-F238E27FC236}">
+                <a16:creationId xmlns:a16="http://schemas.microsoft.com/office/drawing/2014/main" id="{6CA6B7C6-7640-5A98-F802-68E4C9A5B534}"/>
+              </a:ext>
+            </a:extLst>
+          </p:cNvPr>
+          <p:cNvPicPr>
+            <a:picLocks noChangeAspect="1"/>
+          </p:cNvPicPr>
+          <p:nvPr/>
+        </p:nvPicPr>
+        <p:blipFill>
+          <a:blip r:embed="rId2"/>
+          <a:stretch>
+            <a:fillRect/>
+          </a:stretch>
+        </p:blipFill>
+        <p:spPr>
+          <a:xfrm>
+            <a:off x="1397636" y="1900876"/>
+            <a:ext cx="9711159" cy="4152605"/>
+          </a:xfrm>
+          <a:prstGeom prst="rect">
+            <a:avLst/>
+          </a:prstGeom>
+        </p:spPr>
+      </p:pic>
+    </p:spTree>
+    <p:extLst>
+      <p:ext uri="{BB962C8B-B14F-4D97-AF65-F5344CB8AC3E}">
+        <p14:creationId xmlns:p14="http://schemas.microsoft.com/office/powerpoint/2010/main" val="1843817268"/>
+      </p:ext>
+    </p:extLst>
+  </p:cSld>
+  <p:clrMapOvr>
+    <a:masterClrMapping/>
+  </p:clrMapOvr>
+</p:sld>
+</file>
+
+<file path=ppt/slides/slide32.xml><?xml version="1.0" encoding="utf-8"?>
+<p:sld xmlns:a="http://schemas.openxmlformats.org/drawingml/2006/main" xmlns:r="http://schemas.openxmlformats.org/officeDocument/2006/relationships" xmlns:p="http://schemas.openxmlformats.org/presentationml/2006/main">
+  <p:cSld>
+    <p:spTree>
+      <p:nvGrpSpPr>
+        <p:cNvPr id="1" name=""/>
+        <p:cNvGrpSpPr/>
+        <p:nvPr/>
+      </p:nvGrpSpPr>
+      <p:grpSpPr>
+        <a:xfrm>
+          <a:off x="0" y="0"/>
+          <a:ext cx="0" cy="0"/>
+          <a:chOff x="0" y="0"/>
+          <a:chExt cx="0" cy="0"/>
+        </a:xfrm>
+      </p:grpSpPr>
+      <p:sp>
+        <p:nvSpPr>
+          <p:cNvPr id="2" name="Title 1">
+            <a:extLst>
+              <a:ext uri="{FF2B5EF4-FFF2-40B4-BE49-F238E27FC236}">
+                <a16:creationId xmlns:a16="http://schemas.microsoft.com/office/drawing/2014/main" id="{19FCC31D-DAF3-93D3-E76D-9600C6B1F16D}"/>
+              </a:ext>
+            </a:extLst>
+          </p:cNvPr>
+          <p:cNvSpPr>
+            <a:spLocks noGrp="1"/>
+          </p:cNvSpPr>
+          <p:nvPr>
+            <p:ph type="title"/>
+          </p:nvPr>
+        </p:nvSpPr>
+        <p:spPr/>
+        <p:txBody>
+          <a:bodyPr/>
+          <a:lstStyle/>
+          <a:p>
+            <a:r>
+              <a:rPr lang="en-US" dirty="0"/>
+              <a:t>Ec2 reserved instances</a:t>
+            </a:r>
+          </a:p>
+        </p:txBody>
+      </p:sp>
+      <p:sp>
+        <p:nvSpPr>
+          <p:cNvPr id="3" name="Content Placeholder 2">
+            <a:extLst>
+              <a:ext uri="{FF2B5EF4-FFF2-40B4-BE49-F238E27FC236}">
+                <a16:creationId xmlns:a16="http://schemas.microsoft.com/office/drawing/2014/main" id="{64B0535B-2BEB-50AB-A48E-53A58B996008}"/>
+              </a:ext>
+            </a:extLst>
+          </p:cNvPr>
+          <p:cNvSpPr>
+            <a:spLocks noGrp="1"/>
+          </p:cNvSpPr>
+          <p:nvPr>
+            <p:ph idx="1"/>
+          </p:nvPr>
+        </p:nvSpPr>
+        <p:spPr/>
+        <p:txBody>
+          <a:bodyPr/>
+          <a:lstStyle/>
+          <a:p>
+            <a:endParaRPr lang="en-US"/>
+          </a:p>
+        </p:txBody>
+      </p:sp>
+      <p:pic>
+        <p:nvPicPr>
+          <p:cNvPr id="4" name="Picture 3">
+            <a:extLst>
+              <a:ext uri="{FF2B5EF4-FFF2-40B4-BE49-F238E27FC236}">
+                <a16:creationId xmlns:a16="http://schemas.microsoft.com/office/drawing/2014/main" id="{D83DAC83-4FD5-79D9-E6D6-42694E2BC660}"/>
+              </a:ext>
+            </a:extLst>
+          </p:cNvPr>
+          <p:cNvPicPr>
+            <a:picLocks noChangeAspect="1"/>
+          </p:cNvPicPr>
+          <p:nvPr/>
+        </p:nvPicPr>
+        <p:blipFill>
+          <a:blip r:embed="rId2"/>
+          <a:stretch>
+            <a:fillRect/>
+          </a:stretch>
+        </p:blipFill>
+        <p:spPr>
+          <a:xfrm>
+            <a:off x="1451579" y="1853754"/>
+            <a:ext cx="9069808" cy="4236613"/>
+          </a:xfrm>
+          <a:prstGeom prst="rect">
+            <a:avLst/>
+          </a:prstGeom>
+        </p:spPr>
+      </p:pic>
+    </p:spTree>
+    <p:extLst>
+      <p:ext uri="{BB962C8B-B14F-4D97-AF65-F5344CB8AC3E}">
+        <p14:creationId xmlns:p14="http://schemas.microsoft.com/office/powerpoint/2010/main" val="579916164"/>
+      </p:ext>
+    </p:extLst>
+  </p:cSld>
+  <p:clrMapOvr>
+    <a:masterClrMapping/>
+  </p:clrMapOvr>
+</p:sld>
+</file>
+
+<file path=ppt/slides/slide33.xml><?xml version="1.0" encoding="utf-8"?>
+<p:sld xmlns:a="http://schemas.openxmlformats.org/drawingml/2006/main" xmlns:r="http://schemas.openxmlformats.org/officeDocument/2006/relationships" xmlns:p="http://schemas.openxmlformats.org/presentationml/2006/main">
+  <p:cSld>
+    <p:spTree>
+      <p:nvGrpSpPr>
+        <p:cNvPr id="1" name=""/>
+        <p:cNvGrpSpPr/>
+        <p:nvPr/>
+      </p:nvGrpSpPr>
+      <p:grpSpPr>
+        <a:xfrm>
+          <a:off x="0" y="0"/>
+          <a:ext cx="0" cy="0"/>
+          <a:chOff x="0" y="0"/>
+          <a:chExt cx="0" cy="0"/>
+        </a:xfrm>
+      </p:grpSpPr>
+      <p:pic>
+        <p:nvPicPr>
+          <p:cNvPr id="4" name="Picture 3">
+            <a:extLst>
+              <a:ext uri="{FF2B5EF4-FFF2-40B4-BE49-F238E27FC236}">
+                <a16:creationId xmlns:a16="http://schemas.microsoft.com/office/drawing/2014/main" id="{32D91603-9C3D-0175-3E17-1CAF8C42FBB3}"/>
+              </a:ext>
+            </a:extLst>
+          </p:cNvPr>
+          <p:cNvPicPr>
+            <a:picLocks noChangeAspect="1"/>
+          </p:cNvPicPr>
+          <p:nvPr/>
+        </p:nvPicPr>
+        <p:blipFill>
+          <a:blip r:embed="rId2"/>
+          <a:stretch>
+            <a:fillRect/>
+          </a:stretch>
+        </p:blipFill>
+        <p:spPr>
+          <a:xfrm>
+            <a:off x="1451578" y="1853755"/>
+            <a:ext cx="9603275" cy="4234744"/>
+          </a:xfrm>
+          <a:prstGeom prst="rect">
+            <a:avLst/>
+          </a:prstGeom>
+        </p:spPr>
+      </p:pic>
+      <p:sp>
+        <p:nvSpPr>
+          <p:cNvPr id="2" name="Title 1">
+            <a:extLst>
+              <a:ext uri="{FF2B5EF4-FFF2-40B4-BE49-F238E27FC236}">
+                <a16:creationId xmlns:a16="http://schemas.microsoft.com/office/drawing/2014/main" id="{0D959FF5-5DCC-AFCF-215D-3D5C75D65EF8}"/>
+              </a:ext>
+            </a:extLst>
+          </p:cNvPr>
+          <p:cNvSpPr>
+            <a:spLocks noGrp="1"/>
+          </p:cNvSpPr>
+          <p:nvPr>
+            <p:ph type="title"/>
+          </p:nvPr>
+        </p:nvSpPr>
+        <p:spPr/>
+        <p:txBody>
+          <a:bodyPr/>
+          <a:lstStyle/>
+          <a:p>
+            <a:r>
+              <a:rPr lang="en-US" dirty="0"/>
+              <a:t>Ec2 savings plan</a:t>
+            </a:r>
+          </a:p>
+        </p:txBody>
+      </p:sp>
+    </p:spTree>
+    <p:extLst>
+      <p:ext uri="{BB962C8B-B14F-4D97-AF65-F5344CB8AC3E}">
+        <p14:creationId xmlns:p14="http://schemas.microsoft.com/office/powerpoint/2010/main" val="3884983761"/>
+      </p:ext>
+    </p:extLst>
+  </p:cSld>
+  <p:clrMapOvr>
+    <a:masterClrMapping/>
+  </p:clrMapOvr>
+</p:sld>
+</file>
+
+<file path=ppt/slides/slide34.xml><?xml version="1.0" encoding="utf-8"?>
+<p:sld xmlns:a="http://schemas.openxmlformats.org/drawingml/2006/main" xmlns:r="http://schemas.openxmlformats.org/officeDocument/2006/relationships" xmlns:p="http://schemas.openxmlformats.org/presentationml/2006/main">
+  <p:cSld>
+    <p:spTree>
+      <p:nvGrpSpPr>
+        <p:cNvPr id="1" name=""/>
+        <p:cNvGrpSpPr/>
+        <p:nvPr/>
+      </p:nvGrpSpPr>
+      <p:grpSpPr>
+        <a:xfrm>
+          <a:off x="0" y="0"/>
+          <a:ext cx="0" cy="0"/>
+          <a:chOff x="0" y="0"/>
+          <a:chExt cx="0" cy="0"/>
+        </a:xfrm>
+      </p:grpSpPr>
+      <p:sp>
+        <p:nvSpPr>
+          <p:cNvPr id="2" name="Title 1">
+            <a:extLst>
+              <a:ext uri="{FF2B5EF4-FFF2-40B4-BE49-F238E27FC236}">
+                <a16:creationId xmlns:a16="http://schemas.microsoft.com/office/drawing/2014/main" id="{7B222B02-B313-DCB1-20C3-CC4A2F093091}"/>
+              </a:ext>
+            </a:extLst>
+          </p:cNvPr>
+          <p:cNvSpPr>
+            <a:spLocks noGrp="1"/>
+          </p:cNvSpPr>
+          <p:nvPr>
+            <p:ph type="title"/>
+          </p:nvPr>
+        </p:nvSpPr>
+        <p:spPr/>
+        <p:txBody>
+          <a:bodyPr/>
+          <a:lstStyle/>
+          <a:p>
+            <a:r>
+              <a:rPr lang="en-US" dirty="0"/>
+              <a:t>Ec2 spot instances</a:t>
+            </a:r>
+          </a:p>
+        </p:txBody>
+      </p:sp>
+      <p:sp>
+        <p:nvSpPr>
+          <p:cNvPr id="3" name="Content Placeholder 2">
+            <a:extLst>
+              <a:ext uri="{FF2B5EF4-FFF2-40B4-BE49-F238E27FC236}">
+                <a16:creationId xmlns:a16="http://schemas.microsoft.com/office/drawing/2014/main" id="{A7F16B3C-7115-162C-943C-292E27660E23}"/>
+              </a:ext>
+            </a:extLst>
+          </p:cNvPr>
+          <p:cNvSpPr>
+            <a:spLocks noGrp="1"/>
+          </p:cNvSpPr>
+          <p:nvPr>
+            <p:ph idx="1"/>
+          </p:nvPr>
+        </p:nvSpPr>
+        <p:spPr/>
+        <p:txBody>
+          <a:bodyPr/>
+          <a:lstStyle/>
+          <a:p>
+            <a:endParaRPr lang="en-US"/>
+          </a:p>
+        </p:txBody>
+      </p:sp>
+      <p:pic>
+        <p:nvPicPr>
+          <p:cNvPr id="4" name="Picture 3">
+            <a:extLst>
+              <a:ext uri="{FF2B5EF4-FFF2-40B4-BE49-F238E27FC236}">
+                <a16:creationId xmlns:a16="http://schemas.microsoft.com/office/drawing/2014/main" id="{314EFFF9-2369-B1A4-6BA8-468D03A33128}"/>
+              </a:ext>
+            </a:extLst>
+          </p:cNvPr>
+          <p:cNvPicPr>
+            <a:picLocks noChangeAspect="1"/>
+          </p:cNvPicPr>
+          <p:nvPr/>
+        </p:nvPicPr>
+        <p:blipFill>
+          <a:blip r:embed="rId2"/>
+          <a:stretch>
+            <a:fillRect/>
+          </a:stretch>
+        </p:blipFill>
+        <p:spPr>
+          <a:xfrm>
+            <a:off x="1451579" y="1853754"/>
+            <a:ext cx="10171012" cy="4242287"/>
+          </a:xfrm>
+          <a:prstGeom prst="rect">
+            <a:avLst/>
+          </a:prstGeom>
+        </p:spPr>
+      </p:pic>
+    </p:spTree>
+    <p:extLst>
+      <p:ext uri="{BB962C8B-B14F-4D97-AF65-F5344CB8AC3E}">
+        <p14:creationId xmlns:p14="http://schemas.microsoft.com/office/powerpoint/2010/main" val="3251777366"/>
+      </p:ext>
+    </p:extLst>
+  </p:cSld>
+  <p:clrMapOvr>
+    <a:masterClrMapping/>
+  </p:clrMapOvr>
+</p:sld>
+</file>
+
+<file path=ppt/slides/slide35.xml><?xml version="1.0" encoding="utf-8"?>
+<p:sld xmlns:a="http://schemas.openxmlformats.org/drawingml/2006/main" xmlns:r="http://schemas.openxmlformats.org/officeDocument/2006/relationships" xmlns:p="http://schemas.openxmlformats.org/presentationml/2006/main">
+  <p:cSld>
+    <p:spTree>
+      <p:nvGrpSpPr>
+        <p:cNvPr id="1" name=""/>
+        <p:cNvGrpSpPr/>
+        <p:nvPr/>
+      </p:nvGrpSpPr>
+      <p:grpSpPr>
+        <a:xfrm>
+          <a:off x="0" y="0"/>
+          <a:ext cx="0" cy="0"/>
+          <a:chOff x="0" y="0"/>
+          <a:chExt cx="0" cy="0"/>
+        </a:xfrm>
+      </p:grpSpPr>
+      <p:sp>
+        <p:nvSpPr>
+          <p:cNvPr id="2" name="Title 1">
+            <a:extLst>
+              <a:ext uri="{FF2B5EF4-FFF2-40B4-BE49-F238E27FC236}">
+                <a16:creationId xmlns:a16="http://schemas.microsoft.com/office/drawing/2014/main" id="{7B66C57C-4659-394E-5B43-B80C948C919C}"/>
+              </a:ext>
+            </a:extLst>
+          </p:cNvPr>
+          <p:cNvSpPr>
+            <a:spLocks noGrp="1"/>
+          </p:cNvSpPr>
+          <p:nvPr>
+            <p:ph type="title"/>
+          </p:nvPr>
+        </p:nvSpPr>
+        <p:spPr/>
+        <p:txBody>
+          <a:bodyPr/>
+          <a:lstStyle/>
+          <a:p>
+            <a:r>
+              <a:rPr lang="en-US" dirty="0"/>
+              <a:t>Ec2 dedicated hosts</a:t>
+            </a:r>
+          </a:p>
+        </p:txBody>
+      </p:sp>
+      <p:sp>
+        <p:nvSpPr>
+          <p:cNvPr id="3" name="Content Placeholder 2">
+            <a:extLst>
+              <a:ext uri="{FF2B5EF4-FFF2-40B4-BE49-F238E27FC236}">
+                <a16:creationId xmlns:a16="http://schemas.microsoft.com/office/drawing/2014/main" id="{B282827E-3925-597D-6B5F-7AC0AB1D6558}"/>
+              </a:ext>
+            </a:extLst>
+          </p:cNvPr>
+          <p:cNvSpPr>
+            <a:spLocks noGrp="1"/>
+          </p:cNvSpPr>
+          <p:nvPr>
+            <p:ph idx="1"/>
+          </p:nvPr>
+        </p:nvSpPr>
+        <p:spPr/>
+        <p:txBody>
+          <a:bodyPr/>
+          <a:lstStyle/>
+          <a:p>
+            <a:endParaRPr lang="en-US"/>
+          </a:p>
+        </p:txBody>
+      </p:sp>
+      <p:pic>
+        <p:nvPicPr>
+          <p:cNvPr id="4" name="Picture 3">
+            <a:extLst>
+              <a:ext uri="{FF2B5EF4-FFF2-40B4-BE49-F238E27FC236}">
+                <a16:creationId xmlns:a16="http://schemas.microsoft.com/office/drawing/2014/main" id="{610E03C8-E682-0D06-3EC9-8C8EBFC49DFD}"/>
+              </a:ext>
+            </a:extLst>
+          </p:cNvPr>
+          <p:cNvPicPr>
+            <a:picLocks noChangeAspect="1"/>
+          </p:cNvPicPr>
+          <p:nvPr/>
+        </p:nvPicPr>
+        <p:blipFill>
+          <a:blip r:embed="rId2"/>
+          <a:stretch>
+            <a:fillRect/>
+          </a:stretch>
+        </p:blipFill>
+        <p:spPr>
+          <a:xfrm>
+            <a:off x="1451579" y="1853754"/>
+            <a:ext cx="10583119" cy="4055116"/>
+          </a:xfrm>
+          <a:prstGeom prst="rect">
+            <a:avLst/>
+          </a:prstGeom>
+        </p:spPr>
+      </p:pic>
+    </p:spTree>
+    <p:extLst>
+      <p:ext uri="{BB962C8B-B14F-4D97-AF65-F5344CB8AC3E}">
+        <p14:creationId xmlns:p14="http://schemas.microsoft.com/office/powerpoint/2010/main" val="3660033792"/>
+      </p:ext>
+    </p:extLst>
+  </p:cSld>
+  <p:clrMapOvr>
+    <a:masterClrMapping/>
+  </p:clrMapOvr>
+</p:sld>
+</file>
+
+<file path=ppt/slides/slide36.xml><?xml version="1.0" encoding="utf-8"?>
+<p:sld xmlns:a="http://schemas.openxmlformats.org/drawingml/2006/main" xmlns:r="http://schemas.openxmlformats.org/officeDocument/2006/relationships" xmlns:p="http://schemas.openxmlformats.org/presentationml/2006/main">
+  <p:cSld>
+    <p:spTree>
+      <p:nvGrpSpPr>
+        <p:cNvPr id="1" name=""/>
+        <p:cNvGrpSpPr/>
+        <p:nvPr/>
+      </p:nvGrpSpPr>
+      <p:grpSpPr>
+        <a:xfrm>
+          <a:off x="0" y="0"/>
+          <a:ext cx="0" cy="0"/>
+          <a:chOff x="0" y="0"/>
+          <a:chExt cx="0" cy="0"/>
+        </a:xfrm>
+      </p:grpSpPr>
+      <p:sp>
+        <p:nvSpPr>
+          <p:cNvPr id="2" name="Title 1">
+            <a:extLst>
+              <a:ext uri="{FF2B5EF4-FFF2-40B4-BE49-F238E27FC236}">
+                <a16:creationId xmlns:a16="http://schemas.microsoft.com/office/drawing/2014/main" id="{5E65A65F-B54C-93DA-3B74-491F463869E6}"/>
+              </a:ext>
+            </a:extLst>
+          </p:cNvPr>
+          <p:cNvSpPr>
+            <a:spLocks noGrp="1"/>
+          </p:cNvSpPr>
+          <p:nvPr>
+            <p:ph type="title"/>
+          </p:nvPr>
+        </p:nvSpPr>
+        <p:spPr/>
+        <p:txBody>
+          <a:bodyPr/>
+          <a:lstStyle/>
+          <a:p>
+            <a:r>
+              <a:rPr lang="en-US" dirty="0"/>
+              <a:t>Ec2 dedicated instances</a:t>
+            </a:r>
+          </a:p>
+        </p:txBody>
+      </p:sp>
+      <p:sp>
+        <p:nvSpPr>
+          <p:cNvPr id="3" name="Content Placeholder 2">
+            <a:extLst>
+              <a:ext uri="{FF2B5EF4-FFF2-40B4-BE49-F238E27FC236}">
+                <a16:creationId xmlns:a16="http://schemas.microsoft.com/office/drawing/2014/main" id="{BE032105-2104-C120-49EE-FCAAED3E04E5}"/>
+              </a:ext>
+            </a:extLst>
+          </p:cNvPr>
+          <p:cNvSpPr>
+            <a:spLocks noGrp="1"/>
+          </p:cNvSpPr>
+          <p:nvPr>
+            <p:ph idx="1"/>
+          </p:nvPr>
+        </p:nvSpPr>
+        <p:spPr/>
+        <p:txBody>
+          <a:bodyPr/>
+          <a:lstStyle/>
+          <a:p>
+            <a:endParaRPr lang="en-US"/>
+          </a:p>
+        </p:txBody>
+      </p:sp>
+      <p:pic>
+        <p:nvPicPr>
+          <p:cNvPr id="4" name="Picture 3">
+            <a:extLst>
+              <a:ext uri="{FF2B5EF4-FFF2-40B4-BE49-F238E27FC236}">
+                <a16:creationId xmlns:a16="http://schemas.microsoft.com/office/drawing/2014/main" id="{9297D230-27B3-643A-1AA4-D76807DCA84D}"/>
+              </a:ext>
+            </a:extLst>
+          </p:cNvPr>
+          <p:cNvPicPr>
+            <a:picLocks noChangeAspect="1"/>
+          </p:cNvPicPr>
+          <p:nvPr/>
+        </p:nvPicPr>
+        <p:blipFill>
+          <a:blip r:embed="rId2"/>
+          <a:stretch>
+            <a:fillRect/>
+          </a:stretch>
+        </p:blipFill>
+        <p:spPr>
+          <a:xfrm>
+            <a:off x="1451579" y="1853754"/>
+            <a:ext cx="10528218" cy="4888252"/>
+          </a:xfrm>
+          <a:prstGeom prst="rect">
+            <a:avLst/>
+          </a:prstGeom>
+        </p:spPr>
+      </p:pic>
+    </p:spTree>
+    <p:extLst>
+      <p:ext uri="{BB962C8B-B14F-4D97-AF65-F5344CB8AC3E}">
+        <p14:creationId xmlns:p14="http://schemas.microsoft.com/office/powerpoint/2010/main" val="1734588009"/>
+      </p:ext>
+    </p:extLst>
+  </p:cSld>
+  <p:clrMapOvr>
+    <a:masterClrMapping/>
+  </p:clrMapOvr>
+</p:sld>
+</file>
+
+<file path=ppt/slides/slide37.xml><?xml version="1.0" encoding="utf-8"?>
+<p:sld xmlns:a="http://schemas.openxmlformats.org/drawingml/2006/main" xmlns:r="http://schemas.openxmlformats.org/officeDocument/2006/relationships" xmlns:p="http://schemas.openxmlformats.org/presentationml/2006/main">
+  <p:cSld>
+    <p:spTree>
+      <p:nvGrpSpPr>
+        <p:cNvPr id="1" name=""/>
+        <p:cNvGrpSpPr/>
+        <p:nvPr/>
+      </p:nvGrpSpPr>
+      <p:grpSpPr>
+        <a:xfrm>
+          <a:off x="0" y="0"/>
+          <a:ext cx="0" cy="0"/>
+          <a:chOff x="0" y="0"/>
+          <a:chExt cx="0" cy="0"/>
+        </a:xfrm>
+      </p:grpSpPr>
+      <p:sp>
+        <p:nvSpPr>
+          <p:cNvPr id="2" name="Title 1">
+            <a:extLst>
+              <a:ext uri="{FF2B5EF4-FFF2-40B4-BE49-F238E27FC236}">
+                <a16:creationId xmlns:a16="http://schemas.microsoft.com/office/drawing/2014/main" id="{D2A5D6F4-4463-4F56-3EE2-410D07F24BFD}"/>
+              </a:ext>
+            </a:extLst>
+          </p:cNvPr>
+          <p:cNvSpPr>
+            <a:spLocks noGrp="1"/>
+          </p:cNvSpPr>
+          <p:nvPr>
+            <p:ph type="title"/>
+          </p:nvPr>
+        </p:nvSpPr>
+        <p:spPr/>
+        <p:txBody>
+          <a:bodyPr/>
+          <a:lstStyle/>
+          <a:p>
+            <a:r>
+              <a:rPr lang="en-US" dirty="0"/>
+              <a:t>Ec2 capacity reservations</a:t>
+            </a:r>
+          </a:p>
+        </p:txBody>
+      </p:sp>
+      <p:sp>
+        <p:nvSpPr>
+          <p:cNvPr id="3" name="Content Placeholder 2">
+            <a:extLst>
+              <a:ext uri="{FF2B5EF4-FFF2-40B4-BE49-F238E27FC236}">
+                <a16:creationId xmlns:a16="http://schemas.microsoft.com/office/drawing/2014/main" id="{CB7241AC-0E50-DDF4-3914-027ED1B30E3A}"/>
+              </a:ext>
+            </a:extLst>
+          </p:cNvPr>
+          <p:cNvSpPr>
+            <a:spLocks noGrp="1"/>
+          </p:cNvSpPr>
+          <p:nvPr>
+            <p:ph idx="1"/>
+          </p:nvPr>
+        </p:nvSpPr>
+        <p:spPr/>
+        <p:txBody>
+          <a:bodyPr/>
+          <a:lstStyle/>
+          <a:p>
+            <a:endParaRPr lang="en-US"/>
+          </a:p>
+        </p:txBody>
+      </p:sp>
+      <p:pic>
+        <p:nvPicPr>
+          <p:cNvPr id="4" name="Picture 3">
+            <a:extLst>
+              <a:ext uri="{FF2B5EF4-FFF2-40B4-BE49-F238E27FC236}">
+                <a16:creationId xmlns:a16="http://schemas.microsoft.com/office/drawing/2014/main" id="{C15B90CC-20E1-0589-5D1E-ED2DB98080F4}"/>
+              </a:ext>
+            </a:extLst>
+          </p:cNvPr>
+          <p:cNvPicPr>
+            <a:picLocks noChangeAspect="1"/>
+          </p:cNvPicPr>
+          <p:nvPr/>
+        </p:nvPicPr>
+        <p:blipFill>
+          <a:blip r:embed="rId2"/>
+          <a:stretch>
+            <a:fillRect/>
+          </a:stretch>
+        </p:blipFill>
+        <p:spPr>
+          <a:xfrm>
+            <a:off x="1365813" y="1853754"/>
+            <a:ext cx="10182746" cy="4266290"/>
+          </a:xfrm>
+          <a:prstGeom prst="rect">
+            <a:avLst/>
+          </a:prstGeom>
+        </p:spPr>
+      </p:pic>
+    </p:spTree>
+    <p:extLst>
+      <p:ext uri="{BB962C8B-B14F-4D97-AF65-F5344CB8AC3E}">
+        <p14:creationId xmlns:p14="http://schemas.microsoft.com/office/powerpoint/2010/main" val="701230459"/>
+      </p:ext>
+    </p:extLst>
+  </p:cSld>
+  <p:clrMapOvr>
+    <a:masterClrMapping/>
+  </p:clrMapOvr>
+</p:sld>
+</file>
+
+<file path=ppt/slides/slide38.xml><?xml version="1.0" encoding="utf-8"?>
+<p:sld xmlns:a="http://schemas.openxmlformats.org/drawingml/2006/main" xmlns:r="http://schemas.openxmlformats.org/officeDocument/2006/relationships" xmlns:p="http://schemas.openxmlformats.org/presentationml/2006/main">
+  <p:cSld>
+    <p:spTree>
+      <p:nvGrpSpPr>
+        <p:cNvPr id="1" name=""/>
+        <p:cNvGrpSpPr/>
+        <p:nvPr/>
+      </p:nvGrpSpPr>
+      <p:grpSpPr>
+        <a:xfrm>
+          <a:off x="0" y="0"/>
+          <a:ext cx="0" cy="0"/>
+          <a:chOff x="0" y="0"/>
+          <a:chExt cx="0" cy="0"/>
+        </a:xfrm>
+      </p:grpSpPr>
+      <p:sp>
+        <p:nvSpPr>
+          <p:cNvPr id="2" name="Title 1">
+            <a:extLst>
+              <a:ext uri="{FF2B5EF4-FFF2-40B4-BE49-F238E27FC236}">
+                <a16:creationId xmlns:a16="http://schemas.microsoft.com/office/drawing/2014/main" id="{BBC1A51A-681D-CF8F-9B7D-517D97FF3F77}"/>
+              </a:ext>
+            </a:extLst>
+          </p:cNvPr>
+          <p:cNvSpPr>
+            <a:spLocks noGrp="1"/>
+          </p:cNvSpPr>
+          <p:nvPr>
+            <p:ph type="title"/>
+          </p:nvPr>
+        </p:nvSpPr>
+        <p:spPr/>
+        <p:txBody>
+          <a:bodyPr/>
+          <a:lstStyle/>
+          <a:p>
+            <a:r>
+              <a:rPr lang="en-US" dirty="0"/>
+              <a:t>Which purchasing option is right for me?</a:t>
+            </a:r>
+          </a:p>
+        </p:txBody>
+      </p:sp>
+      <p:sp>
+        <p:nvSpPr>
+          <p:cNvPr id="3" name="Content Placeholder 2">
+            <a:extLst>
+              <a:ext uri="{FF2B5EF4-FFF2-40B4-BE49-F238E27FC236}">
+                <a16:creationId xmlns:a16="http://schemas.microsoft.com/office/drawing/2014/main" id="{305D431D-B2A4-3D55-67C3-CE1C097115CC}"/>
+              </a:ext>
+            </a:extLst>
+          </p:cNvPr>
+          <p:cNvSpPr>
+            <a:spLocks noGrp="1"/>
+          </p:cNvSpPr>
+          <p:nvPr>
+            <p:ph idx="1"/>
+          </p:nvPr>
+        </p:nvSpPr>
+        <p:spPr/>
+        <p:txBody>
+          <a:bodyPr>
+            <a:normAutofit fontScale="85000" lnSpcReduction="10000"/>
+          </a:bodyPr>
+          <a:lstStyle/>
+          <a:p>
+            <a:r>
+              <a:rPr lang="en-US" dirty="0"/>
+              <a:t>Example – resort</a:t>
+            </a:r>
+          </a:p>
+          <a:p>
+            <a:r>
+              <a:rPr lang="en-US" dirty="0"/>
+              <a:t>On demand – coming and staying in resort whenever we like, we pay the full price.</a:t>
+            </a:r>
+          </a:p>
+          <a:p>
+            <a:r>
+              <a:rPr lang="en-US" dirty="0"/>
+              <a:t>Reserved – like planning ahead and if we plan to stay for too long time, we may get a good discount.</a:t>
+            </a:r>
+          </a:p>
+          <a:p>
+            <a:r>
+              <a:rPr lang="en-US" dirty="0"/>
+              <a:t>Savings plans – pay a certain amount per hour for certain period and stay in any room type.</a:t>
+            </a:r>
+          </a:p>
+          <a:p>
+            <a:r>
+              <a:rPr lang="en-US" dirty="0"/>
+              <a:t>Spot instances – the hotel allows people to bid for the empty rooms and the highest bidder keeps the rooms. You can get kicked out at any time.</a:t>
+            </a:r>
+          </a:p>
+          <a:p>
+            <a:r>
+              <a:rPr lang="en-US" dirty="0"/>
+              <a:t>Dedicated hosts – we book an entire building of the resort.</a:t>
+            </a:r>
+          </a:p>
+          <a:p>
+            <a:r>
+              <a:rPr lang="en-US" dirty="0"/>
+              <a:t>Capacity reservations – you book a room for a period with full price even you don’t stay </a:t>
+            </a:r>
+            <a:r>
+              <a:rPr lang="en-US"/>
+              <a:t>in it.</a:t>
+            </a:r>
+          </a:p>
+        </p:txBody>
+      </p:sp>
+    </p:spTree>
+    <p:extLst>
+      <p:ext uri="{BB962C8B-B14F-4D97-AF65-F5344CB8AC3E}">
+        <p14:creationId xmlns:p14="http://schemas.microsoft.com/office/powerpoint/2010/main" val="2783369243"/>
       </p:ext>
     </p:extLst>
   </p:cSld>

</xml_diff>